<commit_message>
Complete 8.2 on my own
</commit_message>
<xml_diff>
--- a/databases/solo_project/Solo Project Schema.pptx
+++ b/databases/solo_project/Solo Project Schema.pptx
@@ -3123,9 +3123,10 @@
           <a:lstStyle/>
           <a:p>
             <a:r>
-              <a:rPr lang="en-US" sz="1600" dirty="0" smtClean="0"/>
-              <a:t>Breed Groups</a:t>
-            </a:r>
+              <a:rPr lang="en-US" sz="1600" smtClean="0"/>
+              <a:t>Groups</a:t>
+            </a:r>
+            <a:endParaRPr lang="en-US" sz="1600" dirty="0" smtClean="0"/>
           </a:p>
           <a:p>
             <a:r>

</xml_diff>

<commit_message>
Create dogbreeds and groups tables
</commit_message>
<xml_diff>
--- a/databases/solo_project/Solo Project Schema.pptx
+++ b/databases/solo_project/Solo Project Schema.pptx
@@ -3054,21 +3054,15 @@
             </a:br>
             <a:r>
               <a:rPr lang="en-US" sz="1800" dirty="0" smtClean="0"/>
-              <a:t>Markings (INT)</a:t>
-            </a:r>
-            <a:br>
-              <a:rPr lang="en-US" sz="1800" dirty="0" smtClean="0"/>
-            </a:br>
+              <a:t>Markings (</a:t>
+            </a:r>
+            <a:r>
+              <a:rPr lang="en-US" sz="1800" smtClean="0"/>
+              <a:t>INT)</a:t>
+            </a:r>
             <a:r>
               <a:rPr lang="en-US" sz="1800" dirty="0" smtClean="0"/>
               <a:t/>
-            </a:r>
-            <a:br>
-              <a:rPr lang="en-US" sz="1800" dirty="0" smtClean="0"/>
-            </a:br>
-            <a:r>
-              <a:rPr lang="en-US" sz="1800" dirty="0" smtClean="0"/>
-              <a:t>Year approved (VARCHAR 255)</a:t>
             </a:r>
             <a:br>
               <a:rPr lang="en-US" sz="1800" dirty="0" smtClean="0"/>
@@ -3123,10 +3117,9 @@
           <a:lstStyle/>
           <a:p>
             <a:r>
-              <a:rPr lang="en-US" sz="1600" smtClean="0"/>
+              <a:rPr lang="en-US" sz="1600" dirty="0" smtClean="0"/>
               <a:t>Groups</a:t>
             </a:r>
-            <a:endParaRPr lang="en-US" sz="1600" dirty="0" smtClean="0"/>
           </a:p>
           <a:p>
             <a:r>

</xml_diff>